<commit_message>
added stuff from presentation into the write up
</commit_message>
<xml_diff>
--- a/Project/aipresentation.pptx
+++ b/Project/aipresentation.pptx
@@ -3275,7 +3275,7 @@
           <p:nvPr>
             <p:extLst>
               <p:ext uri="{D42A27DB-BD31-4B8C-83A1-F6EECF244321}">
-                <p14:modId xmlns:p14="http://schemas.microsoft.com/office/powerpoint/2010/main" val="642659412"/>
+                <p14:modId xmlns:p14="http://schemas.microsoft.com/office/powerpoint/2010/main" val="120038103"/>
               </p:ext>
             </p:extLst>
           </p:nvPr>
@@ -3335,16 +3335,6 @@
                     <a:p>
                       <a:pPr algn="l" fontAlgn="b"/>
                       <a:r>
-                        <a:rPr lang="en-US" sz="1200" b="0" i="0" u="none" strike="noStrike" dirty="0">
-                          <a:solidFill>
-                            <a:srgbClr val="000000"/>
-                          </a:solidFill>
-                          <a:effectLst/>
-                          <a:latin typeface="Calibri" charset="0"/>
-                        </a:rPr>
-                        <a:t>train </a:t>
-                      </a:r>
-                      <a:r>
                         <a:rPr lang="en-US" sz="1200" b="0" i="0" u="none" strike="noStrike" dirty="0" smtClean="0">
                           <a:solidFill>
                             <a:srgbClr val="000000"/>
@@ -3352,7 +3342,17 @@
                           <a:effectLst/>
                           <a:latin typeface="Calibri" charset="0"/>
                         </a:rPr>
-                        <a:t>time (s)</a:t>
+                        <a:t>Training Time</a:t>
+                      </a:r>
+                      <a:r>
+                        <a:rPr lang="en-US" sz="1200" b="0" i="0" u="none" strike="noStrike" baseline="0" dirty="0" smtClean="0">
+                          <a:solidFill>
+                            <a:srgbClr val="000000"/>
+                          </a:solidFill>
+                          <a:effectLst/>
+                          <a:latin typeface="Calibri" charset="0"/>
+                        </a:rPr>
+                        <a:t> (s)</a:t>
                       </a:r>
                       <a:endParaRPr lang="en-US" sz="1200" b="0" i="0" u="none" strike="noStrike" dirty="0">
                         <a:solidFill>
@@ -3385,16 +3385,6 @@
                     <a:p>
                       <a:pPr algn="l" fontAlgn="b"/>
                       <a:r>
-                        <a:rPr lang="en-US" sz="1200" b="0" i="0" u="none" strike="noStrike" dirty="0">
-                          <a:solidFill>
-                            <a:srgbClr val="000000"/>
-                          </a:solidFill>
-                          <a:effectLst/>
-                          <a:latin typeface="Calibri" charset="0"/>
-                        </a:rPr>
-                        <a:t>test </a:t>
-                      </a:r>
-                      <a:r>
                         <a:rPr lang="en-US" sz="1200" b="0" i="0" u="none" strike="noStrike" dirty="0" smtClean="0">
                           <a:solidFill>
                             <a:srgbClr val="000000"/>
@@ -3402,7 +3392,7 @@
                           <a:effectLst/>
                           <a:latin typeface="Calibri" charset="0"/>
                         </a:rPr>
-                        <a:t>time (s)</a:t>
+                        <a:t>Testing Time (s)</a:t>
                       </a:r>
                       <a:endParaRPr lang="en-US" sz="1200" b="0" i="0" u="none" strike="noStrike" dirty="0">
                         <a:solidFill>

</xml_diff>